<commit_message>
slides8f, 9m-draft, start edit of CP_min_weight_span_tree
</commit_message>
<xml_diff>
--- a/fall11/slidesF11/slides8m.pptx
+++ b/fall11/slidesF11/slides8m.pptx
@@ -3396,11 +3396,7 @@
             </a:r>
             <a:r>
               <a:rPr lang="en-US" dirty="0" smtClean="0"/>
-              <a:t> </a:t>
-            </a:r>
-            <a:r>
-              <a:rPr lang="en-US" dirty="0" smtClean="0"/>
-              <a:t>8M.</a:t>
+              <a:t> 8M.</a:t>
             </a:r>
             <a:fld id="{2AF49EA3-B1C2-4437-84E9-F0A2054D847B}" type="slidenum">
               <a:rPr lang="en-US" smtClean="0"/>
@@ -3473,11 +3469,7 @@
             </a:r>
             <a:r>
               <a:rPr lang="en-US" dirty="0" smtClean="0"/>
-              <a:t> </a:t>
-            </a:r>
-            <a:r>
-              <a:rPr lang="en-US" dirty="0" smtClean="0"/>
-              <a:t>8M.</a:t>
+              <a:t> 8M.</a:t>
             </a:r>
             <a:fld id="{03FA38D7-FC4B-409C-BF09-87DC9513A286}" type="slidenum">
               <a:rPr lang="en-US" smtClean="0"/>
@@ -3709,11 +3701,7 @@
             </a:r>
             <a:r>
               <a:rPr lang="en-US" dirty="0" smtClean="0"/>
-              <a:t> </a:t>
-            </a:r>
-            <a:r>
-              <a:rPr lang="en-US" dirty="0" smtClean="0"/>
-              <a:t>8M.</a:t>
+              <a:t> 8M.</a:t>
             </a:r>
             <a:fld id="{CE7090F7-0A66-45DA-8B16-6E98536F68F9}" type="slidenum">
               <a:rPr lang="en-US" smtClean="0"/>
@@ -3858,11 +3846,7 @@
             </a:r>
             <a:r>
               <a:rPr lang="en-US" dirty="0" smtClean="0"/>
-              <a:t> </a:t>
-            </a:r>
-            <a:r>
-              <a:rPr lang="en-US" dirty="0" smtClean="0"/>
-              <a:t>8M.</a:t>
+              <a:t> 8M.</a:t>
             </a:r>
             <a:fld id="{96F619E6-6DF7-40A3-ABA3-08075F9C9DE7}" type="slidenum">
               <a:rPr lang="en-US" smtClean="0"/>
@@ -4027,11 +4011,7 @@
             </a:r>
             <a:r>
               <a:rPr lang="en-US" dirty="0" smtClean="0"/>
-              <a:t> </a:t>
-            </a:r>
-            <a:r>
-              <a:rPr lang="en-US" dirty="0" smtClean="0"/>
-              <a:t>8M.</a:t>
+              <a:t> 8M.</a:t>
             </a:r>
             <a:fld id="{23581F62-E8B7-48F2-9B8D-F880FB41BDA1}" type="slidenum">
               <a:rPr lang="en-US" smtClean="0"/>
@@ -4122,11 +4102,7 @@
             </a:r>
             <a:r>
               <a:rPr lang="en-US" dirty="0" smtClean="0"/>
-              <a:t> </a:t>
-            </a:r>
-            <a:r>
-              <a:rPr lang="en-US" dirty="0" smtClean="0"/>
-              <a:t>8M.</a:t>
+              <a:t> 8M.</a:t>
             </a:r>
             <a:fld id="{0D9BACEC-3AFE-4D6A-95F7-22928FA1E0D4}" type="slidenum">
               <a:rPr lang="en-US" smtClean="0"/>
@@ -4194,11 +4170,7 @@
             </a:r>
             <a:r>
               <a:rPr lang="en-US" dirty="0" smtClean="0"/>
-              <a:t> </a:t>
-            </a:r>
-            <a:r>
-              <a:rPr lang="en-US" dirty="0" smtClean="0"/>
-              <a:t>8M.</a:t>
+              <a:t> 8M.</a:t>
             </a:r>
             <a:fld id="{F6BE0579-943A-465D-AC8F-BB4FC82F6263}" type="slidenum">
               <a:rPr lang="en-US" smtClean="0"/>
@@ -4424,11 +4396,7 @@
             </a:r>
             <a:r>
               <a:rPr lang="en-US" dirty="0" smtClean="0"/>
-              <a:t> </a:t>
-            </a:r>
-            <a:r>
-              <a:rPr lang="en-US" dirty="0" smtClean="0"/>
-              <a:t>8M.</a:t>
+              <a:t> 8M.</a:t>
             </a:r>
             <a:fld id="{9ABFFDF2-8EF6-4F3E-BC91-5F16E330E069}" type="slidenum">
               <a:rPr lang="en-US" smtClean="0"/>
@@ -4594,11 +4562,7 @@
             </a:r>
             <a:r>
               <a:rPr lang="en-US" dirty="0" smtClean="0"/>
-              <a:t> </a:t>
-            </a:r>
-            <a:r>
-              <a:rPr lang="en-US" dirty="0" smtClean="0"/>
-              <a:t>8M.</a:t>
+              <a:t> 8M.</a:t>
             </a:r>
             <a:fld id="{1411C1AC-AFEC-49C2-A4DB-6DB9A4610281}" type="slidenum">
               <a:rPr lang="en-US" smtClean="0"/>
@@ -4748,11 +4712,7 @@
             </a:r>
             <a:r>
               <a:rPr lang="en-US" dirty="0" smtClean="0"/>
-              <a:t> </a:t>
-            </a:r>
-            <a:r>
-              <a:rPr lang="en-US" dirty="0" smtClean="0"/>
-              <a:t>8M.</a:t>
+              <a:t> 8M.</a:t>
             </a:r>
             <a:fld id="{54FC5BA4-4A2B-46CF-88E0-09AFB3EDD392}" type="slidenum">
               <a:rPr lang="en-US" smtClean="0"/>
@@ -4850,11 +4810,7 @@
             </a:r>
             <a:r>
               <a:rPr lang="en-US" dirty="0" smtClean="0"/>
-              <a:t> </a:t>
-            </a:r>
-            <a:r>
-              <a:rPr lang="en-US" dirty="0" smtClean="0"/>
-              <a:t>8M.</a:t>
+              <a:t> 8M.</a:t>
             </a:r>
             <a:fld id="{1F620FA0-E02D-432F-B1A1-B885B2F690E6}" type="slidenum">
               <a:rPr lang="en-US" smtClean="0"/>
@@ -5771,11 +5727,7 @@
             </a:r>
             <a:r>
               <a:rPr lang="en-US" dirty="0" smtClean="0"/>
-              <a:t> </a:t>
-            </a:r>
-            <a:r>
-              <a:rPr lang="en-US" dirty="0" smtClean="0"/>
-              <a:t>8M.</a:t>
+              <a:t> 8M.</a:t>
             </a:r>
             <a:fld id="{1469509F-3470-40DB-914A-049BEEC9D3EB}" type="slidenum">
               <a:rPr lang="en-US" smtClean="0"/>
@@ -6354,11 +6306,7 @@
             </a:r>
             <a:r>
               <a:rPr lang="en-US" dirty="0" smtClean="0"/>
-              <a:t> </a:t>
-            </a:r>
-            <a:r>
-              <a:rPr lang="en-US" dirty="0" smtClean="0"/>
-              <a:t>8M.</a:t>
+              <a:t> 8M.</a:t>
             </a:r>
             <a:fld id="{ACF40DFD-16BB-4195-87D0-F1A44B357E55}" type="slidenum">
               <a:rPr lang="en-US" smtClean="0"/>
@@ -6515,11 +6463,6 @@
               </a:rPr>
               <a:t>Graphs:</a:t>
             </a:r>
-            <a:endParaRPr lang="en-US" sz="7200" dirty="0" smtClean="0">
-              <a:solidFill>
-                <a:schemeClr val="tx2"/>
-              </a:solidFill>
-            </a:endParaRPr>
           </a:p>
           <a:p>
             <a:pPr algn="ctr">
@@ -6615,11 +6558,7 @@
             </a:r>
             <a:r>
               <a:rPr lang="en-US" dirty="0" smtClean="0"/>
-              <a:t> </a:t>
-            </a:r>
-            <a:r>
-              <a:rPr lang="en-US" dirty="0" smtClean="0"/>
-              <a:t>8M.</a:t>
+              <a:t> 8M.</a:t>
             </a:r>
             <a:fld id="{831ACAC5-1659-4052-9034-479785513DB7}" type="slidenum">
               <a:rPr lang="en-US" smtClean="0"/>
@@ -6732,7 +6671,7 @@
           <a:graphicData uri="http://schemas.openxmlformats.org/presentationml/2006/ole">
             <mc:AlternateContent xmlns:mc="http://schemas.openxmlformats.org/markup-compatibility/2006">
               <mc:Choice xmlns:v="urn:schemas-microsoft-com:vml" Requires="v">
-                <p:oleObj spid="_x0000_s576537" name="Equation" r:id="rId4" imgW="1346040" imgH="406080" progId="Equation.DSMT4">
+                <p:oleObj spid="_x0000_s576540" name="Equation" r:id="rId4" imgW="1346040" imgH="406080" progId="Equation.DSMT4">
                   <p:embed/>
                 </p:oleObj>
               </mc:Choice>
@@ -6913,11 +6852,7 @@
             </a:r>
             <a:r>
               <a:rPr lang="en-US" dirty="0" smtClean="0"/>
-              <a:t> </a:t>
-            </a:r>
-            <a:r>
-              <a:rPr lang="en-US" dirty="0" smtClean="0"/>
-              <a:t>8M.</a:t>
+              <a:t> 8M.</a:t>
             </a:r>
             <a:fld id="{F12B3927-AFCA-411B-8D8F-6D769C9711B9}" type="slidenum">
               <a:rPr lang="en-US" smtClean="0"/>
@@ -7339,11 +7274,7 @@
             </a:r>
             <a:r>
               <a:rPr lang="en-US" dirty="0" smtClean="0"/>
-              <a:t> </a:t>
-            </a:r>
-            <a:r>
-              <a:rPr lang="en-US" dirty="0" smtClean="0"/>
-              <a:t>8M.</a:t>
+              <a:t> 8M.</a:t>
             </a:r>
             <a:fld id="{CA425DB4-F99B-4E5E-837F-A44D5F82AB30}" type="slidenum">
               <a:rPr lang="en-US" smtClean="0"/>
@@ -8564,7 +8495,7 @@
           <a:graphicData uri="http://schemas.openxmlformats.org/presentationml/2006/ole">
             <mc:AlternateContent xmlns:mc="http://schemas.openxmlformats.org/markup-compatibility/2006">
               <mc:Choice xmlns:v="urn:schemas-microsoft-com:vml" Requires="v">
-                <p:oleObj spid="_x0000_s1055" name="Equation" r:id="rId4" imgW="1777680" imgH="342720" progId="Equation.DSMT4">
+                <p:oleObj spid="_x0000_s1064" name="Equation" r:id="rId4" imgW="1777680" imgH="342720" progId="Equation.DSMT4">
                   <p:embed/>
                 </p:oleObj>
               </mc:Choice>
@@ -8700,7 +8631,7 @@
           <a:graphicData uri="http://schemas.openxmlformats.org/presentationml/2006/ole">
             <mc:AlternateContent xmlns:mc="http://schemas.openxmlformats.org/markup-compatibility/2006">
               <mc:Choice xmlns:v="urn:schemas-microsoft-com:vml" Requires="v">
-                <p:oleObj spid="_x0000_s1056" name="Equation" r:id="rId6" imgW="1828800" imgH="571320" progId="Equation.DSMT4">
+                <p:oleObj spid="_x0000_s1065" name="Equation" r:id="rId6" imgW="1828800" imgH="571320" progId="Equation.DSMT4">
                   <p:embed/>
                 </p:oleObj>
               </mc:Choice>
@@ -8776,7 +8707,7 @@
           <a:graphicData uri="http://schemas.openxmlformats.org/presentationml/2006/ole">
             <mc:AlternateContent xmlns:mc="http://schemas.openxmlformats.org/markup-compatibility/2006">
               <mc:Choice xmlns:v="urn:schemas-microsoft-com:vml" Requires="v">
-                <p:oleObj spid="_x0000_s1057" name="Equation" r:id="rId8" imgW="660400" imgH="419100" progId="Equation.DSMT4">
+                <p:oleObj spid="_x0000_s1066" name="Equation" r:id="rId8" imgW="660400" imgH="419100" progId="Equation.DSMT4">
                   <p:embed/>
                 </p:oleObj>
               </mc:Choice>
@@ -8846,7 +8777,7 @@
           <a:graphicData uri="http://schemas.openxmlformats.org/presentationml/2006/ole">
             <mc:AlternateContent xmlns:mc="http://schemas.openxmlformats.org/markup-compatibility/2006">
               <mc:Choice xmlns:v="urn:schemas-microsoft-com:vml" Requires="v">
-                <p:oleObj spid="_x0000_s1058" name="Equation" r:id="rId10" imgW="660400" imgH="419100" progId="Equation.DSMT4">
+                <p:oleObj spid="_x0000_s1067" name="Equation" r:id="rId10" imgW="660400" imgH="419100" progId="Equation.DSMT4">
                   <p:embed/>
                 </p:oleObj>
               </mc:Choice>
@@ -8904,13 +8835,13 @@
   <p:clrMapOvr>
     <a:masterClrMapping/>
   </p:clrMapOvr>
-  <mc:AlternateContent xmlns:mc="http://schemas.openxmlformats.org/markup-compatibility/2006">
-    <mc:Choice xmlns:p14="http://schemas.microsoft.com/office/powerpoint/2010/main" Requires="p14">
+  <mc:AlternateContent xmlns:mc="http://schemas.openxmlformats.org/markup-compatibility/2006" xmlns:p14="http://schemas.microsoft.com/office/powerpoint/2010/main">
+    <mc:Choice Requires="p14">
       <p:transition spd="med" p14:dur="700">
         <p:fade/>
       </p:transition>
     </mc:Choice>
-    <mc:Fallback>
+    <mc:Fallback xmlns="">
       <p:transition xmlns:p14="http://schemas.microsoft.com/office/powerpoint/2010/main" spd="med">
         <p:fade/>
       </p:transition>
@@ -9234,11 +9165,7 @@
             </a:r>
             <a:r>
               <a:rPr lang="en-US" dirty="0" smtClean="0"/>
-              <a:t> </a:t>
-            </a:r>
-            <a:r>
-              <a:rPr lang="en-US" dirty="0" smtClean="0"/>
-              <a:t>8M.</a:t>
+              <a:t> 8M.</a:t>
             </a:r>
             <a:fld id="{53D395A9-E7C7-4B11-83F8-7DDACDCBDC3E}" type="slidenum">
               <a:rPr lang="en-US" smtClean="0"/>
@@ -9265,7 +9192,7 @@
           <a:graphicData uri="http://schemas.openxmlformats.org/presentationml/2006/ole">
             <mc:AlternateContent xmlns:mc="http://schemas.openxmlformats.org/markup-compatibility/2006">
               <mc:Choice xmlns:v="urn:schemas-microsoft-com:vml" Requires="v">
-                <p:oleObj spid="_x0000_s655379" name="Equation" r:id="rId4" imgW="2273040" imgH="469800" progId="Equation.DSMT4">
+                <p:oleObj spid="_x0000_s655382" name="Equation" r:id="rId4" imgW="2273040" imgH="469800" progId="Equation.DSMT4">
                   <p:embed/>
                 </p:oleObj>
               </mc:Choice>
@@ -10037,11 +9964,7 @@
             </a:r>
             <a:r>
               <a:rPr lang="en-US" dirty="0" smtClean="0"/>
-              <a:t> </a:t>
-            </a:r>
-            <a:r>
-              <a:rPr lang="en-US" dirty="0" smtClean="0"/>
-              <a:t>8M.</a:t>
+              <a:t> 8M.</a:t>
             </a:r>
             <a:fld id="{A913FA39-6498-4AB9-AF91-22F99A6D6F00}" type="slidenum">
               <a:rPr lang="en-US" smtClean="0"/>
@@ -10139,11 +10062,7 @@
             </a:r>
             <a:r>
               <a:rPr lang="en-US" dirty="0" smtClean="0"/>
-              <a:t> </a:t>
-            </a:r>
-            <a:r>
-              <a:rPr lang="en-US" dirty="0" smtClean="0"/>
-              <a:t>8M.</a:t>
+              <a:t> 8M.</a:t>
             </a:r>
             <a:fld id="{80838894-100E-4519-8E62-44A287AD6BD4}" type="slidenum">
               <a:rPr lang="en-US" smtClean="0"/>
@@ -11935,11 +11854,7 @@
             </a:r>
             <a:r>
               <a:rPr lang="en-US" dirty="0" smtClean="0"/>
-              <a:t> </a:t>
-            </a:r>
-            <a:r>
-              <a:rPr lang="en-US" dirty="0" smtClean="0"/>
-              <a:t>8M.</a:t>
+              <a:t> 8M.</a:t>
             </a:r>
             <a:fld id="{B240AD19-D171-4C36-BC34-165F4F829BC6}" type="slidenum">
               <a:rPr lang="en-US" smtClean="0"/>
@@ -13755,11 +13670,7 @@
             </a:r>
             <a:r>
               <a:rPr lang="en-US" dirty="0" smtClean="0"/>
-              <a:t> </a:t>
-            </a:r>
-            <a:r>
-              <a:rPr lang="en-US" dirty="0" smtClean="0"/>
-              <a:t>8M.</a:t>
+              <a:t> 8M.</a:t>
             </a:r>
             <a:fld id="{68A93573-C3A1-4216-A253-FAD638233C5A}" type="slidenum">
               <a:rPr lang="en-US" smtClean="0"/>
@@ -14150,11 +14061,7 @@
             </a:r>
             <a:r>
               <a:rPr lang="en-US" dirty="0" smtClean="0"/>
-              <a:t> </a:t>
-            </a:r>
-            <a:r>
-              <a:rPr lang="en-US" dirty="0" smtClean="0"/>
-              <a:t>8M.</a:t>
+              <a:t> 8M.</a:t>
             </a:r>
             <a:fld id="{5E3C3489-5335-4071-A373-779F9E8C608D}" type="slidenum">
               <a:rPr lang="en-US" smtClean="0"/>
@@ -14537,11 +14444,7 @@
             </a:r>
             <a:r>
               <a:rPr lang="en-US" dirty="0" smtClean="0"/>
-              <a:t> </a:t>
-            </a:r>
-            <a:r>
-              <a:rPr lang="en-US" dirty="0" smtClean="0"/>
-              <a:t>8M.</a:t>
+              <a:t> 8M.</a:t>
             </a:r>
             <a:fld id="{293C45EC-E261-4166-BBC4-7B298A3E1090}" type="slidenum">
               <a:rPr lang="en-US" smtClean="0"/>
@@ -16073,27 +15976,36 @@
                             </p:childTnLst>
                           </p:cTn>
                         </p:par>
+                      </p:childTnLst>
+                    </p:cTn>
+                  </p:par>
+                  <p:par>
+                    <p:cTn id="11" fill="hold">
+                      <p:stCondLst>
+                        <p:cond delay="indefinite"/>
+                      </p:stCondLst>
+                      <p:childTnLst>
                         <p:par>
-                          <p:cTn id="11" fill="hold">
+                          <p:cTn id="12" fill="hold">
                             <p:stCondLst>
                               <p:cond delay="0"/>
                             </p:stCondLst>
                             <p:childTnLst>
                               <p:par>
-                                <p:cTn id="12" presetID="9" presetClass="entr" presetSubtype="0" fill="hold" grpId="0" nodeType="afterEffect">
+                                <p:cTn id="13" presetID="9" presetClass="entr" presetSubtype="0" fill="hold" grpId="0" nodeType="clickEffect">
                                   <p:stCondLst>
                                     <p:cond delay="0"/>
                                   </p:stCondLst>
                                   <p:childTnLst>
                                     <p:set>
                                       <p:cBhvr>
-                                        <p:cTn id="13" dur="1" fill="hold">
+                                        <p:cTn id="14" dur="1" fill="hold">
                                           <p:stCondLst>
                                             <p:cond delay="0"/>
                                           </p:stCondLst>
                                         </p:cTn>
                                         <p:tgtEl>
-                                          <p:spTgt spid="560174"/>
+                                          <p:spTgt spid="38"/>
                                         </p:tgtEl>
                                         <p:attrNameLst>
                                           <p:attrName>style.visibility</p:attrName>
@@ -16105,9 +16017,9 @@
                                     </p:set>
                                     <p:animEffect transition="in" filter="dissolve">
                                       <p:cBhvr>
-                                        <p:cTn id="14" dur="1000"/>
+                                        <p:cTn id="15" dur="500"/>
                                         <p:tgtEl>
-                                          <p:spTgt spid="560174"/>
+                                          <p:spTgt spid="38"/>
                                         </p:tgtEl>
                                       </p:cBhvr>
                                     </p:animEffect>
@@ -16117,23 +16029,14 @@
                             </p:childTnLst>
                           </p:cTn>
                         </p:par>
-                      </p:childTnLst>
-                    </p:cTn>
-                  </p:par>
-                  <p:par>
-                    <p:cTn id="15" fill="hold">
-                      <p:stCondLst>
-                        <p:cond delay="indefinite"/>
-                      </p:stCondLst>
-                      <p:childTnLst>
                         <p:par>
                           <p:cTn id="16" fill="hold">
                             <p:stCondLst>
-                              <p:cond delay="0"/>
+                              <p:cond delay="500"/>
                             </p:stCondLst>
                             <p:childTnLst>
                               <p:par>
-                                <p:cTn id="17" presetID="9" presetClass="entr" presetSubtype="0" fill="hold" grpId="0" nodeType="clickEffect">
+                                <p:cTn id="17" presetID="9" presetClass="entr" presetSubtype="0" fill="hold" grpId="0" nodeType="afterEffect">
                                   <p:stCondLst>
                                     <p:cond delay="0"/>
                                   </p:stCondLst>
@@ -16208,7 +16111,7 @@
                         <p:par>
                           <p:cTn id="23" fill="hold">
                             <p:stCondLst>
-                              <p:cond delay="1000"/>
+                              <p:cond delay="1500"/>
                             </p:stCondLst>
                             <p:childTnLst>
                               <p:par>
@@ -16225,7 +16128,7 @@
                                           </p:stCondLst>
                                         </p:cTn>
                                         <p:tgtEl>
-                                          <p:spTgt spid="38"/>
+                                          <p:spTgt spid="560174"/>
                                         </p:tgtEl>
                                         <p:attrNameLst>
                                           <p:attrName>style.visibility</p:attrName>
@@ -16237,9 +16140,9 @@
                                     </p:set>
                                     <p:animEffect transition="in" filter="dissolve">
                                       <p:cBhvr>
-                                        <p:cTn id="26" dur="500"/>
+                                        <p:cTn id="26" dur="1000"/>
                                         <p:tgtEl>
-                                          <p:spTgt spid="38"/>
+                                          <p:spTgt spid="560174"/>
                                         </p:tgtEl>
                                       </p:cBhvr>
                                     </p:animEffect>
@@ -16321,11 +16224,7 @@
             </a:r>
             <a:r>
               <a:rPr lang="en-US" dirty="0" smtClean="0"/>
-              <a:t> </a:t>
-            </a:r>
-            <a:r>
-              <a:rPr lang="en-US" dirty="0" smtClean="0"/>
-              <a:t>8M.</a:t>
+              <a:t> 8M.</a:t>
             </a:r>
             <a:fld id="{AA7FE549-B246-4F98-AB9B-E10B9848818D}" type="slidenum">
               <a:rPr lang="en-US" smtClean="0"/>
@@ -18147,11 +18046,7 @@
             </a:r>
             <a:r>
               <a:rPr lang="en-US" dirty="0" smtClean="0"/>
-              <a:t> </a:t>
-            </a:r>
-            <a:r>
-              <a:rPr lang="en-US" dirty="0" smtClean="0"/>
-              <a:t>8M.</a:t>
+              <a:t> 8M.</a:t>
             </a:r>
             <a:fld id="{046B1DE3-69C3-424B-B7F0-9CF8344ADFF4}" type="slidenum">
               <a:rPr lang="en-US" smtClean="0"/>
@@ -19468,11 +19363,7 @@
             </a:r>
             <a:r>
               <a:rPr lang="en-US" dirty="0" smtClean="0"/>
-              <a:t> </a:t>
-            </a:r>
-            <a:r>
-              <a:rPr lang="en-US" dirty="0" smtClean="0"/>
-              <a:t>8M.</a:t>
+              <a:t> 8M.</a:t>
             </a:r>
             <a:fld id="{1AC59D09-C0B9-4025-A086-F05489DDA977}" type="slidenum">
               <a:rPr lang="en-US" smtClean="0"/>
@@ -20917,11 +20808,7 @@
             </a:r>
             <a:r>
               <a:rPr lang="en-US" dirty="0" smtClean="0"/>
-              <a:t> </a:t>
-            </a:r>
-            <a:r>
-              <a:rPr lang="en-US" dirty="0" smtClean="0"/>
-              <a:t>8M.</a:t>
+              <a:t> 8M.</a:t>
             </a:r>
             <a:fld id="{1DB5B75C-AF40-408B-B111-07AA97733054}" type="slidenum">
               <a:rPr lang="en-US" smtClean="0"/>
@@ -22563,11 +22450,7 @@
             </a:r>
             <a:r>
               <a:rPr lang="en-US" dirty="0" smtClean="0"/>
-              <a:t> </a:t>
-            </a:r>
-            <a:r>
-              <a:rPr lang="en-US" dirty="0" smtClean="0"/>
-              <a:t>8M.</a:t>
+              <a:t> 8M.</a:t>
             </a:r>
             <a:fld id="{A0329A7B-0CDF-4474-9D5E-25E9C11592CB}" type="slidenum">
               <a:rPr lang="en-US" smtClean="0"/>
@@ -23210,11 +23093,7 @@
             </a:r>
             <a:r>
               <a:rPr lang="en-US" dirty="0" smtClean="0"/>
-              <a:t> </a:t>
-            </a:r>
-            <a:r>
-              <a:rPr lang="en-US" dirty="0" smtClean="0"/>
-              <a:t>8M.</a:t>
+              <a:t> 8M.</a:t>
             </a:r>
             <a:fld id="{B88CF5CE-1058-4BB5-8192-EF3446247848}" type="slidenum">
               <a:rPr lang="en-US" smtClean="0"/>
@@ -24541,11 +24420,7 @@
             </a:r>
             <a:r>
               <a:rPr lang="en-US" dirty="0" smtClean="0"/>
-              <a:t> </a:t>
-            </a:r>
-            <a:r>
-              <a:rPr lang="en-US" dirty="0" smtClean="0"/>
-              <a:t>8M.</a:t>
+              <a:t> 8M.</a:t>
             </a:r>
             <a:fld id="{8DE3D2CC-F788-4557-8ECB-878F673AE85C}" type="slidenum">
               <a:rPr lang="en-US" smtClean="0"/>
@@ -24782,11 +24657,7 @@
             </a:r>
             <a:r>
               <a:rPr lang="en-US" dirty="0" smtClean="0"/>
-              <a:t> </a:t>
-            </a:r>
-            <a:r>
-              <a:rPr lang="en-US" dirty="0" smtClean="0"/>
-              <a:t>8M.</a:t>
+              <a:t> 8M.</a:t>
             </a:r>
             <a:fld id="{15D60AE2-77FF-43D7-8AD9-B8A424F004F9}" type="slidenum">
               <a:rPr lang="en-US" smtClean="0"/>
@@ -25586,11 +25457,7 @@
             </a:r>
             <a:r>
               <a:rPr lang="en-US" dirty="0" smtClean="0"/>
-              <a:t> </a:t>
-            </a:r>
-            <a:r>
-              <a:rPr lang="en-US" dirty="0" smtClean="0"/>
-              <a:t>8M.</a:t>
+              <a:t> 8M.</a:t>
             </a:r>
             <a:fld id="{3AEDE1B4-22B9-44CE-94B1-9B4CDE94A4EF}" type="slidenum">
               <a:rPr lang="en-US" smtClean="0"/>
@@ -25835,11 +25702,7 @@
             </a:r>
             <a:r>
               <a:rPr lang="en-US" dirty="0" smtClean="0"/>
-              <a:t> </a:t>
-            </a:r>
-            <a:r>
-              <a:rPr lang="en-US" dirty="0" smtClean="0"/>
-              <a:t>8M.</a:t>
+              <a:t> 8M.</a:t>
             </a:r>
             <a:fld id="{8CB76801-ECFD-4E75-B29A-84CDB3DBBAA0}" type="slidenum">
               <a:rPr lang="en-US" smtClean="0"/>
@@ -26294,11 +26157,7 @@
             </a:r>
             <a:r>
               <a:rPr lang="en-US" dirty="0" smtClean="0"/>
-              <a:t> </a:t>
-            </a:r>
-            <a:r>
-              <a:rPr lang="en-US" dirty="0" smtClean="0"/>
-              <a:t>8M.</a:t>
+              <a:t> 8M.</a:t>
             </a:r>
             <a:fld id="{AB737AA2-ECB3-4299-BD05-681A14996687}" type="slidenum">
               <a:rPr lang="en-US" smtClean="0"/>
@@ -26574,11 +26433,7 @@
             </a:r>
             <a:r>
               <a:rPr lang="en-US" dirty="0" smtClean="0"/>
-              <a:t> </a:t>
-            </a:r>
-            <a:r>
-              <a:rPr lang="en-US" dirty="0" smtClean="0"/>
-              <a:t>8M.</a:t>
+              <a:t> 8M.</a:t>
             </a:r>
             <a:fld id="{A76D6F42-45A9-4E0C-ABC6-5B1DF8C9DA4D}" type="slidenum">
               <a:rPr lang="en-US" smtClean="0"/>
@@ -28846,11 +28701,7 @@
             </a:r>
             <a:r>
               <a:rPr lang="en-US" dirty="0" smtClean="0"/>
-              <a:t> </a:t>
-            </a:r>
-            <a:r>
-              <a:rPr lang="en-US" dirty="0" smtClean="0"/>
-              <a:t>8M.</a:t>
+              <a:t> 8M.</a:t>
             </a:r>
             <a:fld id="{CFEB42D4-4E47-493C-8554-B54FE0E35A40}" type="slidenum">
               <a:rPr lang="en-US" smtClean="0"/>
@@ -29755,11 +29606,7 @@
             </a:r>
             <a:r>
               <a:rPr lang="en-US" dirty="0" smtClean="0"/>
-              <a:t> </a:t>
-            </a:r>
-            <a:r>
-              <a:rPr lang="en-US" dirty="0" smtClean="0"/>
-              <a:t>8M.</a:t>
+              <a:t> 8M.</a:t>
             </a:r>
             <a:fld id="{ACC363C6-8D9D-421F-8655-B729B7FC22AD}" type="slidenum">
               <a:rPr lang="en-US" smtClean="0"/>
@@ -30287,11 +30134,7 @@
             </a:r>
             <a:r>
               <a:rPr lang="en-US" dirty="0" smtClean="0"/>
-              <a:t> </a:t>
-            </a:r>
-            <a:r>
-              <a:rPr lang="en-US" dirty="0" smtClean="0"/>
-              <a:t>8M.</a:t>
+              <a:t> 8M.</a:t>
             </a:r>
             <a:fld id="{E52A4584-A2D5-43DA-9AC5-529CD51A4E42}" type="slidenum">
               <a:rPr lang="en-US" smtClean="0"/>
@@ -31402,11 +31245,7 @@
             </a:r>
             <a:r>
               <a:rPr lang="en-US" dirty="0" smtClean="0"/>
-              <a:t> </a:t>
-            </a:r>
-            <a:r>
-              <a:rPr lang="en-US" dirty="0" smtClean="0"/>
-              <a:t>8M.</a:t>
+              <a:t> 8M.</a:t>
             </a:r>
             <a:fld id="{D701E121-6727-41EF-AC65-3B0FD0B8E2FF}" type="slidenum">
               <a:rPr lang="en-US" smtClean="0"/>
@@ -32597,11 +32436,7 @@
             </a:r>
             <a:r>
               <a:rPr lang="en-US" dirty="0" smtClean="0"/>
-              <a:t> </a:t>
-            </a:r>
-            <a:r>
-              <a:rPr lang="en-US" dirty="0" smtClean="0"/>
-              <a:t>8M.</a:t>
+              <a:t> 8M.</a:t>
             </a:r>
             <a:fld id="{2B7191F5-D72E-4363-9C6F-D02F3D2E27BA}" type="slidenum">
               <a:rPr lang="en-US" smtClean="0"/>
@@ -32669,7 +32504,7 @@
           <a:graphicData uri="http://schemas.openxmlformats.org/presentationml/2006/ole">
             <mc:AlternateContent xmlns:mc="http://schemas.openxmlformats.org/markup-compatibility/2006">
               <mc:Choice xmlns:v="urn:schemas-microsoft-com:vml" Requires="v">
-                <p:oleObj spid="_x0000_s575507" name="Equation" r:id="rId4" imgW="1346040" imgH="406080" progId="Equation.DSMT4">
+                <p:oleObj spid="_x0000_s575510" name="Equation" r:id="rId4" imgW="1346040" imgH="406080" progId="Equation.DSMT4">
                   <p:embed/>
                 </p:oleObj>
               </mc:Choice>

</xml_diff>